<commit_message>
Final changes to get to version 1.0
</commit_message>
<xml_diff>
--- a/DataFlow.pptx
+++ b/DataFlow.pptx
@@ -114,7 +114,7 @@
 
 <file path=ppt/commentAuthors.xml><?xml version="1.0" encoding="utf-8"?>
 <p:cmAuthorLst xmlns:a="http://schemas.openxmlformats.org/drawingml/2006/main" xmlns:r="http://schemas.openxmlformats.org/officeDocument/2006/relationships" xmlns:p="http://schemas.openxmlformats.org/presentationml/2006/main">
-  <p:cmAuthor id="1" name="Sam Davey" initials="SD" lastIdx="1" clrIdx="0">
+  <p:cmAuthor id="1" name="Sam Davey" initials="SD" lastIdx="4" clrIdx="0">
     <p:extLst>
       <p:ext uri="{19B8F6BF-5375-455C-9EA6-DF929625EA0E}">
         <p15:presenceInfo xmlns:p15="http://schemas.microsoft.com/office/powerpoint/2012/main" userId="S-1-5-21-2000478354-1972579041-725345543-43036" providerId="AD"/>
@@ -122,20 +122,6 @@
     </p:extLst>
   </p:cmAuthor>
 </p:cmAuthorLst>
-</file>
-
-<file path=ppt/comments/comment1.xml><?xml version="1.0" encoding="utf-8"?>
-<p:cmLst xmlns:a="http://schemas.openxmlformats.org/drawingml/2006/main" xmlns:r="http://schemas.openxmlformats.org/officeDocument/2006/relationships" xmlns:p="http://schemas.openxmlformats.org/presentationml/2006/main">
-  <p:cm authorId="1" dt="2017-04-18T15:44:43.143" idx="1">
-    <p:pos x="1366" y="966"/>
-    <p:text>Join Annual before Seasonal because we'll need to make two versions: seasonal and annual (with seasons transposed)</p:text>
-    <p:extLst>
-      <p:ext uri="{C676402C-5697-4E1C-873F-D02D1690AC5C}">
-        <p15:threadingInfo xmlns:p15="http://schemas.microsoft.com/office/powerpoint/2012/main" timeZoneBias="-480"/>
-      </p:ext>
-    </p:extLst>
-  </p:cm>
-</p:cmLst>
 </file>
 
 <file path=ppt/slideLayouts/slideLayout1.xml><?xml version="1.0" encoding="utf-8"?>
@@ -269,7 +255,7 @@
           <a:p>
             <a:fld id="{F9294074-D30E-41DD-B50E-84D556131587}" type="datetimeFigureOut">
               <a:rPr lang="en-AU" smtClean="0"/>
-              <a:t>18/04/2017</a:t>
+              <a:t>8/07/2017</a:t>
             </a:fld>
             <a:endParaRPr lang="en-AU"/>
           </a:p>
@@ -439,7 +425,7 @@
           <a:p>
             <a:fld id="{F9294074-D30E-41DD-B50E-84D556131587}" type="datetimeFigureOut">
               <a:rPr lang="en-AU" smtClean="0"/>
-              <a:t>18/04/2017</a:t>
+              <a:t>8/07/2017</a:t>
             </a:fld>
             <a:endParaRPr lang="en-AU"/>
           </a:p>
@@ -619,7 +605,7 @@
           <a:p>
             <a:fld id="{F9294074-D30E-41DD-B50E-84D556131587}" type="datetimeFigureOut">
               <a:rPr lang="en-AU" smtClean="0"/>
-              <a:t>18/04/2017</a:t>
+              <a:t>8/07/2017</a:t>
             </a:fld>
             <a:endParaRPr lang="en-AU"/>
           </a:p>
@@ -789,7 +775,7 @@
           <a:p>
             <a:fld id="{F9294074-D30E-41DD-B50E-84D556131587}" type="datetimeFigureOut">
               <a:rPr lang="en-AU" smtClean="0"/>
-              <a:t>18/04/2017</a:t>
+              <a:t>8/07/2017</a:t>
             </a:fld>
             <a:endParaRPr lang="en-AU"/>
           </a:p>
@@ -1033,7 +1019,7 @@
           <a:p>
             <a:fld id="{F9294074-D30E-41DD-B50E-84D556131587}" type="datetimeFigureOut">
               <a:rPr lang="en-AU" smtClean="0"/>
-              <a:t>18/04/2017</a:t>
+              <a:t>8/07/2017</a:t>
             </a:fld>
             <a:endParaRPr lang="en-AU"/>
           </a:p>
@@ -1265,7 +1251,7 @@
           <a:p>
             <a:fld id="{F9294074-D30E-41DD-B50E-84D556131587}" type="datetimeFigureOut">
               <a:rPr lang="en-AU" smtClean="0"/>
-              <a:t>18/04/2017</a:t>
+              <a:t>8/07/2017</a:t>
             </a:fld>
             <a:endParaRPr lang="en-AU"/>
           </a:p>
@@ -1632,7 +1618,7 @@
           <a:p>
             <a:fld id="{F9294074-D30E-41DD-B50E-84D556131587}" type="datetimeFigureOut">
               <a:rPr lang="en-AU" smtClean="0"/>
-              <a:t>18/04/2017</a:t>
+              <a:t>8/07/2017</a:t>
             </a:fld>
             <a:endParaRPr lang="en-AU"/>
           </a:p>
@@ -1750,7 +1736,7 @@
           <a:p>
             <a:fld id="{F9294074-D30E-41DD-B50E-84D556131587}" type="datetimeFigureOut">
               <a:rPr lang="en-AU" smtClean="0"/>
-              <a:t>18/04/2017</a:t>
+              <a:t>8/07/2017</a:t>
             </a:fld>
             <a:endParaRPr lang="en-AU"/>
           </a:p>
@@ -1845,7 +1831,7 @@
           <a:p>
             <a:fld id="{F9294074-D30E-41DD-B50E-84D556131587}" type="datetimeFigureOut">
               <a:rPr lang="en-AU" smtClean="0"/>
-              <a:t>18/04/2017</a:t>
+              <a:t>8/07/2017</a:t>
             </a:fld>
             <a:endParaRPr lang="en-AU"/>
           </a:p>
@@ -2122,7 +2108,7 @@
           <a:p>
             <a:fld id="{F9294074-D30E-41DD-B50E-84D556131587}" type="datetimeFigureOut">
               <a:rPr lang="en-AU" smtClean="0"/>
-              <a:t>18/04/2017</a:t>
+              <a:t>8/07/2017</a:t>
             </a:fld>
             <a:endParaRPr lang="en-AU"/>
           </a:p>
@@ -2379,7 +2365,7 @@
           <a:p>
             <a:fld id="{F9294074-D30E-41DD-B50E-84D556131587}" type="datetimeFigureOut">
               <a:rPr lang="en-AU" smtClean="0"/>
-              <a:t>18/04/2017</a:t>
+              <a:t>8/07/2017</a:t>
             </a:fld>
             <a:endParaRPr lang="en-AU"/>
           </a:p>
@@ -2592,7 +2578,7 @@
           <a:p>
             <a:fld id="{F9294074-D30E-41DD-B50E-84D556131587}" type="datetimeFigureOut">
               <a:rPr lang="en-AU" smtClean="0"/>
-              <a:t>18/04/2017</a:t>
+              <a:t>8/07/2017</a:t>
             </a:fld>
             <a:endParaRPr lang="en-AU"/>
           </a:p>
@@ -3011,6 +2997,12 @@
           <a:prstGeom prst="flowChartDocument">
             <a:avLst/>
           </a:prstGeom>
+          <a:solidFill>
+            <a:schemeClr val="accent6">
+              <a:lumMod val="20000"/>
+              <a:lumOff val="80000"/>
+            </a:schemeClr>
+          </a:solidFill>
         </p:spPr>
         <p:style>
           <a:lnRef idx="2">
@@ -3052,6 +3044,12 @@
           <a:prstGeom prst="flowChartInternalStorage">
             <a:avLst/>
           </a:prstGeom>
+          <a:solidFill>
+            <a:schemeClr val="accent6">
+              <a:lumMod val="20000"/>
+              <a:lumOff val="80000"/>
+            </a:schemeClr>
+          </a:solidFill>
         </p:spPr>
         <p:style>
           <a:lnRef idx="2">
@@ -3094,6 +3092,12 @@
           <a:prstGeom prst="flowChartDocument">
             <a:avLst/>
           </a:prstGeom>
+          <a:solidFill>
+            <a:schemeClr val="accent6">
+              <a:lumMod val="20000"/>
+              <a:lumOff val="80000"/>
+            </a:schemeClr>
+          </a:solidFill>
         </p:spPr>
         <p:style>
           <a:lnRef idx="2">
@@ -3135,6 +3139,12 @@
           <a:prstGeom prst="flowChartInternalStorage">
             <a:avLst/>
           </a:prstGeom>
+          <a:solidFill>
+            <a:schemeClr val="accent6">
+              <a:lumMod val="20000"/>
+              <a:lumOff val="80000"/>
+            </a:schemeClr>
+          </a:solidFill>
         </p:spPr>
         <p:style>
           <a:lnRef idx="2">
@@ -3249,6 +3259,12 @@
           <a:prstGeom prst="flowChartDocument">
             <a:avLst/>
           </a:prstGeom>
+          <a:solidFill>
+            <a:schemeClr val="accent6">
+              <a:lumMod val="20000"/>
+              <a:lumOff val="80000"/>
+            </a:schemeClr>
+          </a:solidFill>
         </p:spPr>
         <p:style>
           <a:lnRef idx="2">
@@ -3284,12 +3300,18 @@
         </p:nvSpPr>
         <p:spPr>
           <a:xfrm>
-            <a:off x="9602446" y="156029"/>
+            <a:off x="10074886" y="156029"/>
             <a:ext cx="723900" cy="469900"/>
           </a:xfrm>
           <a:prstGeom prst="flowChartDocument">
             <a:avLst/>
           </a:prstGeom>
+          <a:solidFill>
+            <a:schemeClr val="accent6">
+              <a:lumMod val="20000"/>
+              <a:lumOff val="80000"/>
+            </a:schemeClr>
+          </a:solidFill>
         </p:spPr>
         <p:style>
           <a:lnRef idx="2">
@@ -3312,49 +3334,13 @@
             <a:pPr algn="ctr"/>
             <a:r>
               <a:rPr lang="en-AU" sz="600" dirty="0"/>
-              <a:t>../0_data/TempData_2_10_2016.txt</a:t>
-            </a:r>
-          </a:p>
-        </p:txBody>
-      </p:sp>
-      <p:sp>
-        <p:nvSpPr>
-          <p:cNvPr id="12" name="Flowchart: Document 11"/>
-          <p:cNvSpPr/>
-          <p:nvPr/>
-        </p:nvSpPr>
-        <p:spPr>
-          <a:xfrm>
-            <a:off x="10570186" y="156029"/>
-            <a:ext cx="723900" cy="469900"/>
-          </a:xfrm>
-          <a:prstGeom prst="flowChartDocument">
-            <a:avLst/>
-          </a:prstGeom>
-        </p:spPr>
-        <p:style>
-          <a:lnRef idx="2">
-            <a:schemeClr val="accent3"/>
-          </a:lnRef>
-          <a:fillRef idx="1">
-            <a:schemeClr val="lt1"/>
-          </a:fillRef>
-          <a:effectRef idx="0">
-            <a:schemeClr val="accent3"/>
-          </a:effectRef>
-          <a:fontRef idx="minor">
-            <a:schemeClr val="dk1"/>
-          </a:fontRef>
-        </p:style>
-        <p:txBody>
-          <a:bodyPr rtlCol="0" anchor="ctr"/>
-          <a:lstStyle/>
-          <a:p>
-            <a:pPr algn="ctr"/>
-            <a:r>
-              <a:rPr lang="en-AU" sz="600" dirty="0"/>
-              <a:t>../0_data/HumidData_2_10_2016.txt</a:t>
-            </a:r>
+              <a:t>../</a:t>
+            </a:r>
+            <a:r>
+              <a:rPr lang="en-AU" sz="600" dirty="0" smtClean="0"/>
+              <a:t>0_data/TempHumd_all.txt</a:t>
+            </a:r>
+            <a:endParaRPr lang="en-AU" sz="600" dirty="0"/>
           </a:p>
         </p:txBody>
       </p:sp>
@@ -3372,6 +3358,12 @@
           <a:prstGeom prst="flowChartInternalStorage">
             <a:avLst/>
           </a:prstGeom>
+          <a:solidFill>
+            <a:schemeClr val="accent6">
+              <a:lumMod val="20000"/>
+              <a:lumOff val="80000"/>
+            </a:schemeClr>
+          </a:solidFill>
         </p:spPr>
         <p:style>
           <a:lnRef idx="2">
@@ -3415,379 +3407,6 @@
             <a:ext cx="1" cy="561926"/>
           </a:xfrm>
           <a:prstGeom prst="straightConnector1">
-            <a:avLst/>
-          </a:prstGeom>
-          <a:ln>
-            <a:tailEnd type="triangle"/>
-          </a:ln>
-        </p:spPr>
-        <p:style>
-          <a:lnRef idx="1">
-            <a:schemeClr val="accent3"/>
-          </a:lnRef>
-          <a:fillRef idx="0">
-            <a:schemeClr val="accent3"/>
-          </a:fillRef>
-          <a:effectRef idx="0">
-            <a:schemeClr val="accent3"/>
-          </a:effectRef>
-          <a:fontRef idx="minor">
-            <a:schemeClr val="tx1"/>
-          </a:fontRef>
-        </p:style>
-      </p:cxnSp>
-      <p:sp>
-        <p:nvSpPr>
-          <p:cNvPr id="15" name="Flowchart: Internal Storage 14"/>
-          <p:cNvSpPr/>
-          <p:nvPr/>
-        </p:nvSpPr>
-        <p:spPr>
-          <a:xfrm>
-            <a:off x="9602444" y="1156789"/>
-            <a:ext cx="723900" cy="480060"/>
-          </a:xfrm>
-          <a:prstGeom prst="flowChartInternalStorage">
-            <a:avLst/>
-          </a:prstGeom>
-        </p:spPr>
-        <p:style>
-          <a:lnRef idx="2">
-            <a:schemeClr val="accent3"/>
-          </a:lnRef>
-          <a:fillRef idx="1">
-            <a:schemeClr val="lt1"/>
-          </a:fillRef>
-          <a:effectRef idx="0">
-            <a:schemeClr val="accent3"/>
-          </a:effectRef>
-          <a:fontRef idx="minor">
-            <a:schemeClr val="dk1"/>
-          </a:fontRef>
-        </p:style>
-        <p:txBody>
-          <a:bodyPr rtlCol="0" anchor="ctr"/>
-          <a:lstStyle/>
-          <a:p>
-            <a:pPr algn="ctr"/>
-            <a:r>
-              <a:rPr lang="en-AU" sz="600"/>
-              <a:t>df_temp</a:t>
-            </a:r>
-            <a:endParaRPr lang="en-AU" sz="600" dirty="0"/>
-          </a:p>
-        </p:txBody>
-      </p:sp>
-      <p:cxnSp>
-        <p:nvCxnSpPr>
-          <p:cNvPr id="16" name="Straight Arrow Connector 15"/>
-          <p:cNvCxnSpPr>
-            <a:stCxn id="11" idx="2"/>
-            <a:endCxn id="15" idx="0"/>
-          </p:cNvCxnSpPr>
-          <p:nvPr/>
-        </p:nvCxnSpPr>
-        <p:spPr>
-          <a:xfrm flipH="1">
-            <a:off x="9964394" y="594863"/>
-            <a:ext cx="2" cy="561926"/>
-          </a:xfrm>
-          <a:prstGeom prst="straightConnector1">
-            <a:avLst/>
-          </a:prstGeom>
-          <a:ln>
-            <a:tailEnd type="triangle"/>
-          </a:ln>
-        </p:spPr>
-        <p:style>
-          <a:lnRef idx="1">
-            <a:schemeClr val="accent3"/>
-          </a:lnRef>
-          <a:fillRef idx="0">
-            <a:schemeClr val="accent3"/>
-          </a:fillRef>
-          <a:effectRef idx="0">
-            <a:schemeClr val="accent3"/>
-          </a:effectRef>
-          <a:fontRef idx="minor">
-            <a:schemeClr val="tx1"/>
-          </a:fontRef>
-        </p:style>
-      </p:cxnSp>
-      <p:sp>
-        <p:nvSpPr>
-          <p:cNvPr id="17" name="Flowchart: Internal Storage 16"/>
-          <p:cNvSpPr/>
-          <p:nvPr/>
-        </p:nvSpPr>
-        <p:spPr>
-          <a:xfrm>
-            <a:off x="10570183" y="1156789"/>
-            <a:ext cx="723900" cy="480060"/>
-          </a:xfrm>
-          <a:prstGeom prst="flowChartInternalStorage">
-            <a:avLst/>
-          </a:prstGeom>
-        </p:spPr>
-        <p:style>
-          <a:lnRef idx="2">
-            <a:schemeClr val="accent3"/>
-          </a:lnRef>
-          <a:fillRef idx="1">
-            <a:schemeClr val="lt1"/>
-          </a:fillRef>
-          <a:effectRef idx="0">
-            <a:schemeClr val="accent3"/>
-          </a:effectRef>
-          <a:fontRef idx="minor">
-            <a:schemeClr val="dk1"/>
-          </a:fontRef>
-        </p:style>
-        <p:txBody>
-          <a:bodyPr rtlCol="0" anchor="ctr"/>
-          <a:lstStyle/>
-          <a:p>
-            <a:pPr algn="ctr"/>
-            <a:r>
-              <a:rPr lang="en-AU" sz="600" dirty="0" err="1"/>
-              <a:t>df_humd</a:t>
-            </a:r>
-            <a:endParaRPr lang="en-AU" sz="600" dirty="0"/>
-          </a:p>
-        </p:txBody>
-      </p:sp>
-      <p:cxnSp>
-        <p:nvCxnSpPr>
-          <p:cNvPr id="18" name="Straight Arrow Connector 17"/>
-          <p:cNvCxnSpPr>
-            <a:stCxn id="12" idx="2"/>
-            <a:endCxn id="17" idx="0"/>
-          </p:cNvCxnSpPr>
-          <p:nvPr/>
-        </p:nvCxnSpPr>
-        <p:spPr>
-          <a:xfrm flipH="1">
-            <a:off x="10932133" y="594863"/>
-            <a:ext cx="3" cy="561926"/>
-          </a:xfrm>
-          <a:prstGeom prst="straightConnector1">
-            <a:avLst/>
-          </a:prstGeom>
-          <a:ln>
-            <a:tailEnd type="triangle"/>
-          </a:ln>
-        </p:spPr>
-        <p:style>
-          <a:lnRef idx="1">
-            <a:schemeClr val="accent3"/>
-          </a:lnRef>
-          <a:fillRef idx="0">
-            <a:schemeClr val="accent3"/>
-          </a:fillRef>
-          <a:effectRef idx="0">
-            <a:schemeClr val="accent3"/>
-          </a:effectRef>
-          <a:fontRef idx="minor">
-            <a:schemeClr val="tx1"/>
-          </a:fontRef>
-        </p:style>
-      </p:cxnSp>
-      <p:sp>
-        <p:nvSpPr>
-          <p:cNvPr id="19" name="Flowchart: Internal Storage 18"/>
-          <p:cNvSpPr/>
-          <p:nvPr/>
-        </p:nvSpPr>
-        <p:spPr>
-          <a:xfrm>
-            <a:off x="3414650" y="2300961"/>
-            <a:ext cx="723900" cy="480060"/>
-          </a:xfrm>
-          <a:prstGeom prst="flowChartInternalStorage">
-            <a:avLst/>
-          </a:prstGeom>
-        </p:spPr>
-        <p:style>
-          <a:lnRef idx="2">
-            <a:schemeClr val="accent3"/>
-          </a:lnRef>
-          <a:fillRef idx="1">
-            <a:schemeClr val="lt1"/>
-          </a:fillRef>
-          <a:effectRef idx="0">
-            <a:schemeClr val="accent3"/>
-          </a:effectRef>
-          <a:fontRef idx="minor">
-            <a:schemeClr val="dk1"/>
-          </a:fontRef>
-        </p:style>
-        <p:txBody>
-          <a:bodyPr rtlCol="0" anchor="ctr"/>
-          <a:lstStyle/>
-          <a:p>
-            <a:pPr algn="ctr"/>
-            <a:r>
-              <a:rPr lang="en-AU" sz="600" dirty="0" err="1"/>
-              <a:t>df_clutch_count</a:t>
-            </a:r>
-            <a:endParaRPr lang="en-AU" sz="600" dirty="0"/>
-          </a:p>
-          <a:p>
-            <a:pPr algn="ctr"/>
-            <a:r>
-              <a:rPr lang="en-AU" sz="600" dirty="0"/>
-              <a:t>(</a:t>
-            </a:r>
-            <a:r>
-              <a:rPr lang="en-AU" sz="600" dirty="0" err="1"/>
-              <a:t>num</a:t>
-            </a:r>
-            <a:r>
-              <a:rPr lang="en-AU" sz="600" dirty="0"/>
-              <a:t> clutches per year)</a:t>
-            </a:r>
-          </a:p>
-        </p:txBody>
-      </p:sp>
-      <p:cxnSp>
-        <p:nvCxnSpPr>
-          <p:cNvPr id="20" name="Straight Arrow Connector 19"/>
-          <p:cNvCxnSpPr>
-            <a:stCxn id="13" idx="2"/>
-            <a:endCxn id="19" idx="0"/>
-          </p:cNvCxnSpPr>
-          <p:nvPr/>
-        </p:nvCxnSpPr>
-        <p:spPr>
-          <a:xfrm flipH="1">
-            <a:off x="3776600" y="1636849"/>
-            <a:ext cx="723900" cy="664112"/>
-          </a:xfrm>
-          <a:prstGeom prst="straightConnector1">
-            <a:avLst/>
-          </a:prstGeom>
-          <a:ln>
-            <a:tailEnd type="triangle"/>
-          </a:ln>
-        </p:spPr>
-        <p:style>
-          <a:lnRef idx="1">
-            <a:schemeClr val="accent3"/>
-          </a:lnRef>
-          <a:fillRef idx="0">
-            <a:schemeClr val="accent3"/>
-          </a:fillRef>
-          <a:effectRef idx="0">
-            <a:schemeClr val="accent3"/>
-          </a:effectRef>
-          <a:fontRef idx="minor">
-            <a:schemeClr val="tx1"/>
-          </a:fontRef>
-        </p:style>
-      </p:cxnSp>
-      <p:sp>
-        <p:nvSpPr>
-          <p:cNvPr id="21" name="TextBox 20"/>
-          <p:cNvSpPr txBox="1"/>
-          <p:nvPr/>
-        </p:nvSpPr>
-        <p:spPr>
-          <a:xfrm>
-            <a:off x="3372315" y="1929912"/>
-            <a:ext cx="730969" cy="184666"/>
-          </a:xfrm>
-          <a:prstGeom prst="rect">
-            <a:avLst/>
-          </a:prstGeom>
-          <a:solidFill>
-            <a:schemeClr val="bg1"/>
-          </a:solidFill>
-        </p:spPr>
-        <p:txBody>
-          <a:bodyPr wrap="none" lIns="0" tIns="0" rIns="0" bIns="0" rtlCol="0">
-            <a:spAutoFit/>
-          </a:bodyPr>
-          <a:lstStyle/>
-          <a:p>
-            <a:r>
-              <a:rPr lang="en-AU" sz="600" dirty="0"/>
-              <a:t>Group by </a:t>
-            </a:r>
-            <a:r>
-              <a:rPr lang="en-AU" sz="600" dirty="0" err="1"/>
-              <a:t>nest_id</a:t>
-            </a:r>
-            <a:r>
-              <a:rPr lang="en-AU" sz="600" dirty="0"/>
-              <a:t>, year</a:t>
-            </a:r>
-            <a:br>
-              <a:rPr lang="en-AU" sz="600" dirty="0"/>
-            </a:br>
-            <a:r>
-              <a:rPr lang="en-AU" sz="600" dirty="0"/>
-              <a:t>Get max clutch number</a:t>
-            </a:r>
-          </a:p>
-        </p:txBody>
-      </p:sp>
-      <p:sp>
-        <p:nvSpPr>
-          <p:cNvPr id="22" name="Flowchart: Internal Storage 21"/>
-          <p:cNvSpPr/>
-          <p:nvPr/>
-        </p:nvSpPr>
-        <p:spPr>
-          <a:xfrm>
-            <a:off x="10074886" y="2300961"/>
-            <a:ext cx="723900" cy="480060"/>
-          </a:xfrm>
-          <a:prstGeom prst="flowChartInternalStorage">
-            <a:avLst/>
-          </a:prstGeom>
-        </p:spPr>
-        <p:style>
-          <a:lnRef idx="2">
-            <a:schemeClr val="accent3"/>
-          </a:lnRef>
-          <a:fillRef idx="1">
-            <a:schemeClr val="lt1"/>
-          </a:fillRef>
-          <a:effectRef idx="0">
-            <a:schemeClr val="accent3"/>
-          </a:effectRef>
-          <a:fontRef idx="minor">
-            <a:schemeClr val="dk1"/>
-          </a:fontRef>
-        </p:style>
-        <p:txBody>
-          <a:bodyPr rtlCol="0" anchor="ctr"/>
-          <a:lstStyle/>
-          <a:p>
-            <a:pPr algn="ctr"/>
-            <a:r>
-              <a:rPr lang="en-AU" sz="600" dirty="0" err="1"/>
-              <a:t>df_sensor_data</a:t>
-            </a:r>
-            <a:endParaRPr lang="en-AU" sz="600" dirty="0"/>
-          </a:p>
-        </p:txBody>
-      </p:sp>
-      <p:cxnSp>
-        <p:nvCxnSpPr>
-          <p:cNvPr id="23" name="Elbow Connector 22"/>
-          <p:cNvCxnSpPr>
-            <a:stCxn id="17" idx="2"/>
-            <a:endCxn id="22" idx="0"/>
-          </p:cNvCxnSpPr>
-          <p:nvPr/>
-        </p:nvCxnSpPr>
-        <p:spPr>
-          <a:xfrm rot="5400000">
-            <a:off x="10352429" y="1721257"/>
-            <a:ext cx="664112" cy="495297"/>
-          </a:xfrm>
-          <a:prstGeom prst="bentConnector3">
             <a:avLst/>
           </a:prstGeom>
           <a:ln>
@@ -3811,22 +3430,20 @@
       </p:cxnSp>
       <p:cxnSp>
         <p:nvCxnSpPr>
-          <p:cNvPr id="24" name="Elbow Connector 23"/>
+          <p:cNvPr id="16" name="Straight Arrow Connector 15"/>
           <p:cNvCxnSpPr>
-            <a:stCxn id="15" idx="2"/>
+            <a:stCxn id="11" idx="2"/>
             <a:endCxn id="22" idx="0"/>
           </p:cNvCxnSpPr>
           <p:nvPr/>
         </p:nvCxnSpPr>
         <p:spPr>
-          <a:xfrm rot="16200000" flipH="1">
-            <a:off x="9868559" y="1732684"/>
-            <a:ext cx="664112" cy="472442"/>
-          </a:xfrm>
-          <a:prstGeom prst="bentConnector3">
-            <a:avLst>
-              <a:gd name="adj1" fmla="val 50000"/>
-            </a:avLst>
+          <a:xfrm>
+            <a:off x="10436836" y="594863"/>
+            <a:ext cx="0" cy="1706098"/>
+          </a:xfrm>
+          <a:prstGeom prst="straightConnector1">
+            <a:avLst/>
           </a:prstGeom>
           <a:ln>
             <a:tailEnd type="triangle"/>
@@ -3849,14 +3466,113 @@
       </p:cxnSp>
       <p:sp>
         <p:nvSpPr>
-          <p:cNvPr id="25" name="TextBox 24"/>
+          <p:cNvPr id="19" name="Flowchart: Internal Storage 18"/>
+          <p:cNvSpPr/>
+          <p:nvPr/>
+        </p:nvSpPr>
+        <p:spPr>
+          <a:xfrm>
+            <a:off x="4744340" y="2300961"/>
+            <a:ext cx="723900" cy="480060"/>
+          </a:xfrm>
+          <a:prstGeom prst="flowChartInternalStorage">
+            <a:avLst/>
+          </a:prstGeom>
+          <a:solidFill>
+            <a:schemeClr val="accent6">
+              <a:lumMod val="20000"/>
+              <a:lumOff val="80000"/>
+            </a:schemeClr>
+          </a:solidFill>
+        </p:spPr>
+        <p:style>
+          <a:lnRef idx="2">
+            <a:schemeClr val="accent3"/>
+          </a:lnRef>
+          <a:fillRef idx="1">
+            <a:schemeClr val="lt1"/>
+          </a:fillRef>
+          <a:effectRef idx="0">
+            <a:schemeClr val="accent3"/>
+          </a:effectRef>
+          <a:fontRef idx="minor">
+            <a:schemeClr val="dk1"/>
+          </a:fontRef>
+        </p:style>
+        <p:txBody>
+          <a:bodyPr rtlCol="0" anchor="ctr"/>
+          <a:lstStyle/>
+          <a:p>
+            <a:pPr algn="ctr"/>
+            <a:r>
+              <a:rPr lang="en-AU" sz="600" dirty="0" err="1"/>
+              <a:t>df_clutch_count</a:t>
+            </a:r>
+            <a:endParaRPr lang="en-AU" sz="600" dirty="0"/>
+          </a:p>
+          <a:p>
+            <a:pPr algn="ctr"/>
+            <a:r>
+              <a:rPr lang="en-AU" sz="600" dirty="0"/>
+              <a:t>(</a:t>
+            </a:r>
+            <a:r>
+              <a:rPr lang="en-AU" sz="600" dirty="0" err="1"/>
+              <a:t>num</a:t>
+            </a:r>
+            <a:r>
+              <a:rPr lang="en-AU" sz="600" dirty="0"/>
+              <a:t> clutches per year)</a:t>
+            </a:r>
+          </a:p>
+        </p:txBody>
+      </p:sp>
+      <p:cxnSp>
+        <p:nvCxnSpPr>
+          <p:cNvPr id="20" name="Straight Arrow Connector 19"/>
+          <p:cNvCxnSpPr>
+            <a:stCxn id="13" idx="2"/>
+            <a:endCxn id="19" idx="0"/>
+          </p:cNvCxnSpPr>
+          <p:nvPr/>
+        </p:nvCxnSpPr>
+        <p:spPr>
+          <a:xfrm>
+            <a:off x="4500500" y="1636849"/>
+            <a:ext cx="605790" cy="664112"/>
+          </a:xfrm>
+          <a:prstGeom prst="straightConnector1">
+            <a:avLst/>
+          </a:prstGeom>
+          <a:ln>
+            <a:tailEnd type="triangle"/>
+          </a:ln>
+        </p:spPr>
+        <p:style>
+          <a:lnRef idx="1">
+            <a:schemeClr val="accent3"/>
+          </a:lnRef>
+          <a:fillRef idx="0">
+            <a:schemeClr val="accent3"/>
+          </a:fillRef>
+          <a:effectRef idx="0">
+            <a:schemeClr val="accent3"/>
+          </a:effectRef>
+          <a:fontRef idx="minor">
+            <a:schemeClr val="tx1"/>
+          </a:fontRef>
+        </p:style>
+      </p:cxnSp>
+      <p:sp>
+        <p:nvSpPr>
+          <p:cNvPr id="21" name="TextBox 20"/>
           <p:cNvSpPr txBox="1"/>
           <p:nvPr/>
         </p:nvSpPr>
         <p:spPr>
           <a:xfrm>
-            <a:off x="9866167" y="1849008"/>
-            <a:ext cx="1141338" cy="92333"/>
+            <a:off x="4702005" y="1929912"/>
+            <a:ext cx="730969" cy="184666"/>
           </a:xfrm>
           <a:prstGeom prst="rect">
             <a:avLst/>
@@ -3871,10 +3587,9 @@
           </a:bodyPr>
           <a:lstStyle/>
           <a:p>
-            <a:pPr algn="ctr"/>
             <a:r>
               <a:rPr lang="en-AU" sz="600" dirty="0"/>
-              <a:t>Join (outer) on </a:t>
+              <a:t>Group by </a:t>
             </a:r>
             <a:r>
               <a:rPr lang="en-AU" sz="600" dirty="0" err="1"/>
@@ -3882,11 +3597,61 @@
             </a:r>
             <a:r>
               <a:rPr lang="en-AU" sz="600" dirty="0"/>
-              <a:t> and </a:t>
-            </a:r>
+              <a:t>, year</a:t>
+            </a:r>
+            <a:br>
+              <a:rPr lang="en-AU" sz="600" dirty="0"/>
+            </a:br>
+            <a:r>
+              <a:rPr lang="en-AU" sz="600" dirty="0"/>
+              <a:t>Get max clutch number</a:t>
+            </a:r>
+          </a:p>
+        </p:txBody>
+      </p:sp>
+      <p:sp>
+        <p:nvSpPr>
+          <p:cNvPr id="22" name="Flowchart: Internal Storage 21"/>
+          <p:cNvSpPr/>
+          <p:nvPr/>
+        </p:nvSpPr>
+        <p:spPr>
+          <a:xfrm>
+            <a:off x="10074886" y="2300961"/>
+            <a:ext cx="723900" cy="480060"/>
+          </a:xfrm>
+          <a:prstGeom prst="flowChartInternalStorage">
+            <a:avLst/>
+          </a:prstGeom>
+          <a:solidFill>
+            <a:schemeClr val="accent6">
+              <a:lumMod val="20000"/>
+              <a:lumOff val="80000"/>
+            </a:schemeClr>
+          </a:solidFill>
+        </p:spPr>
+        <p:style>
+          <a:lnRef idx="2">
+            <a:schemeClr val="accent3"/>
+          </a:lnRef>
+          <a:fillRef idx="1">
+            <a:schemeClr val="lt1"/>
+          </a:fillRef>
+          <a:effectRef idx="0">
+            <a:schemeClr val="accent3"/>
+          </a:effectRef>
+          <a:fontRef idx="minor">
+            <a:schemeClr val="dk1"/>
+          </a:fontRef>
+        </p:style>
+        <p:txBody>
+          <a:bodyPr rtlCol="0" anchor="ctr"/>
+          <a:lstStyle/>
+          <a:p>
+            <a:pPr algn="ctr"/>
             <a:r>
               <a:rPr lang="en-AU" sz="600" dirty="0" err="1"/>
-              <a:t>datetime</a:t>
+              <a:t>df_sensor_data</a:t>
             </a:r>
             <a:endParaRPr lang="en-AU" sz="600" dirty="0"/>
           </a:p>
@@ -3900,12 +3665,18 @@
         </p:nvSpPr>
         <p:spPr>
           <a:xfrm>
-            <a:off x="4804640" y="2300961"/>
+            <a:off x="3445718" y="2300961"/>
             <a:ext cx="723900" cy="480060"/>
           </a:xfrm>
           <a:prstGeom prst="flowChartInternalStorage">
             <a:avLst/>
           </a:prstGeom>
+          <a:solidFill>
+            <a:schemeClr val="accent6">
+              <a:lumMod val="20000"/>
+              <a:lumOff val="80000"/>
+            </a:schemeClr>
+          </a:solidFill>
         </p:spPr>
         <p:style>
           <a:lnRef idx="2">
@@ -3951,9 +3722,9 @@
           <p:nvPr/>
         </p:nvCxnSpPr>
         <p:spPr>
-          <a:xfrm>
-            <a:off x="4500500" y="1636849"/>
-            <a:ext cx="666090" cy="664112"/>
+          <a:xfrm flipH="1">
+            <a:off x="3807668" y="1636849"/>
+            <a:ext cx="692832" cy="664112"/>
           </a:xfrm>
           <a:prstGeom prst="straightConnector1">
             <a:avLst/>
@@ -3985,7 +3756,7 @@
         </p:nvSpPr>
         <p:spPr>
           <a:xfrm>
-            <a:off x="4470085" y="1837579"/>
+            <a:off x="3111163" y="1837579"/>
             <a:ext cx="1393010" cy="369332"/>
           </a:xfrm>
           <a:prstGeom prst="rect">
@@ -4069,20 +3840,25 @@
         <p:nvCxnSpPr>
           <p:cNvPr id="29" name="Elbow Connector 28"/>
           <p:cNvCxnSpPr>
-            <a:stCxn id="7" idx="2"/>
+            <a:stCxn id="96" idx="2"/>
             <a:endCxn id="32" idx="0"/>
           </p:cNvCxnSpPr>
           <p:nvPr/>
         </p:nvCxnSpPr>
         <p:spPr>
           <a:xfrm rot="5400000">
-            <a:off x="1369783" y="1731454"/>
-            <a:ext cx="664112" cy="474903"/>
+            <a:off x="1257442" y="2637513"/>
+            <a:ext cx="888794" cy="474903"/>
           </a:xfrm>
           <a:prstGeom prst="bentConnector3">
             <a:avLst/>
           </a:prstGeom>
           <a:ln>
+            <a:solidFill>
+              <a:schemeClr val="bg1">
+                <a:lumMod val="65000"/>
+              </a:schemeClr>
+            </a:solidFill>
             <a:tailEnd type="triangle"/>
           </a:ln>
         </p:spPr>
@@ -4109,7 +3885,7 @@
         </p:nvSpPr>
         <p:spPr>
           <a:xfrm>
-            <a:off x="1014800" y="1849008"/>
+            <a:off x="1014800" y="2761855"/>
             <a:ext cx="904094" cy="92333"/>
           </a:xfrm>
           <a:prstGeom prst="rect">
@@ -4149,13 +3925,20 @@
         </p:nvCxnSpPr>
         <p:spPr>
           <a:xfrm rot="16200000" flipH="1">
-            <a:off x="885912" y="1722486"/>
-            <a:ext cx="664112" cy="492837"/>
+            <a:off x="376712" y="2231686"/>
+            <a:ext cx="1682512" cy="492837"/>
           </a:xfrm>
           <a:prstGeom prst="bentConnector3">
-            <a:avLst/>
+            <a:avLst>
+              <a:gd name="adj1" fmla="val 73494"/>
+            </a:avLst>
           </a:prstGeom>
           <a:ln>
+            <a:solidFill>
+              <a:schemeClr val="bg1">
+                <a:lumMod val="65000"/>
+              </a:schemeClr>
+            </a:solidFill>
             <a:tailEnd type="triangle"/>
           </a:ln>
         </p:spPr>
@@ -4182,12 +3965,18 @@
         </p:nvSpPr>
         <p:spPr>
           <a:xfrm>
-            <a:off x="1102437" y="2300961"/>
+            <a:off x="1102437" y="3319361"/>
             <a:ext cx="723900" cy="480060"/>
           </a:xfrm>
           <a:prstGeom prst="flowChartInternalStorage">
             <a:avLst/>
           </a:prstGeom>
+          <a:solidFill>
+            <a:schemeClr val="accent6">
+              <a:lumMod val="20000"/>
+              <a:lumOff val="80000"/>
+            </a:schemeClr>
+          </a:solidFill>
         </p:spPr>
         <p:style>
           <a:lnRef idx="2">
@@ -4223,7 +4012,7 @@
           <p:nvPr/>
         </p:nvCxnSpPr>
         <p:spPr>
-          <a:xfrm>
+          <a:xfrm flipH="1">
             <a:off x="4401731" y="2896044"/>
             <a:ext cx="224790" cy="0"/>
           </a:xfrm>
@@ -4263,6 +4052,12 @@
           <a:prstGeom prst="flowChartInternalStorage">
             <a:avLst/>
           </a:prstGeom>
+          <a:solidFill>
+            <a:schemeClr val="accent6">
+              <a:lumMod val="20000"/>
+              <a:lumOff val="80000"/>
+            </a:schemeClr>
+          </a:solidFill>
         </p:spPr>
         <p:style>
           <a:lnRef idx="2">
@@ -4335,8 +4130,8 @@
         </p:nvSpPr>
         <p:spPr>
           <a:xfrm>
-            <a:off x="10137888" y="2896044"/>
-            <a:ext cx="597920" cy="276999"/>
+            <a:off x="10119456" y="2896044"/>
+            <a:ext cx="634789" cy="276999"/>
           </a:xfrm>
           <a:prstGeom prst="rect">
             <a:avLst/>
@@ -4357,7 +4152,18 @@
               <a:t>Add </a:t>
             </a:r>
             <a:r>
-              <a:rPr lang="en-AU" sz="600" dirty="0" err="1"/>
+              <a:rPr lang="en-AU" sz="600" dirty="0" err="1" smtClean="0"/>
+              <a:t>breeding_year</a:t>
+            </a:r>
+            <a:r>
+              <a:rPr lang="en-AU" sz="600" dirty="0" smtClean="0"/>
+              <a:t>, </a:t>
+            </a:r>
+          </a:p>
+          <a:p>
+            <a:pPr algn="ctr"/>
+            <a:r>
+              <a:rPr lang="en-AU" sz="600" dirty="0" err="1" smtClean="0"/>
               <a:t>temp_bucket</a:t>
             </a:r>
             <a:r>
@@ -4368,19 +4174,8 @@
               <a:rPr lang="en-AU" sz="600" dirty="0"/>
             </a:br>
             <a:r>
-              <a:rPr lang="en-AU" sz="600" dirty="0" err="1"/>
+              <a:rPr lang="en-AU" sz="600" dirty="0" err="1" smtClean="0"/>
               <a:t>humidity_bucket</a:t>
-            </a:r>
-            <a:r>
-              <a:rPr lang="en-AU" sz="600" dirty="0"/>
-              <a:t>, </a:t>
-            </a:r>
-            <a:br>
-              <a:rPr lang="en-AU" sz="600" dirty="0"/>
-            </a:br>
-            <a:r>
-              <a:rPr lang="en-AU" sz="600" dirty="0" err="1"/>
-              <a:t>avg_activity_phase</a:t>
             </a:r>
             <a:endParaRPr lang="en-AU" sz="600" dirty="0"/>
           </a:p>
@@ -4509,6 +4304,12 @@
           <a:prstGeom prst="flowChartInternalStorage">
             <a:avLst/>
           </a:prstGeom>
+          <a:solidFill>
+            <a:schemeClr val="accent6">
+              <a:lumMod val="20000"/>
+              <a:lumOff val="80000"/>
+            </a:schemeClr>
+          </a:solidFill>
         </p:spPr>
         <p:style>
           <a:lnRef idx="2">
@@ -4530,8 +4331,8 @@
           <a:p>
             <a:pPr algn="ctr"/>
             <a:r>
-              <a:rPr lang="en-AU" sz="600" dirty="0" err="1"/>
-              <a:t>df_breeding_annual_stats</a:t>
+              <a:rPr lang="en-AU" sz="600" dirty="0" err="1" smtClean="0"/>
+              <a:t>df_breeding_cclutch_stats</a:t>
             </a:r>
             <a:endParaRPr lang="en-AU" sz="600" dirty="0"/>
           </a:p>
@@ -4547,9 +4348,9 @@
           <p:nvPr/>
         </p:nvCxnSpPr>
         <p:spPr>
-          <a:xfrm rot="16200000" flipH="1">
-            <a:off x="3879933" y="2677688"/>
-            <a:ext cx="530860" cy="737526"/>
+          <a:xfrm rot="5400000">
+            <a:off x="4544778" y="2750369"/>
+            <a:ext cx="530860" cy="592164"/>
           </a:xfrm>
           <a:prstGeom prst="bentConnector3">
             <a:avLst>
@@ -4585,9 +4386,9 @@
           <p:nvPr/>
         </p:nvCxnSpPr>
         <p:spPr>
-          <a:xfrm rot="5400000">
-            <a:off x="4574928" y="2720219"/>
-            <a:ext cx="530860" cy="652464"/>
+          <a:xfrm rot="16200000" flipH="1">
+            <a:off x="3895467" y="2693222"/>
+            <a:ext cx="530860" cy="706458"/>
           </a:xfrm>
           <a:prstGeom prst="bentConnector3">
             <a:avLst>
@@ -4667,6 +4468,12 @@
           <a:prstGeom prst="flowChartInternalStorage">
             <a:avLst/>
           </a:prstGeom>
+          <a:solidFill>
+            <a:schemeClr val="accent6">
+              <a:lumMod val="20000"/>
+              <a:lumOff val="80000"/>
+            </a:schemeClr>
+          </a:solidFill>
         </p:spPr>
         <p:style>
           <a:lnRef idx="2">
@@ -4706,8 +4513,8 @@
         </p:nvCxnSpPr>
         <p:spPr>
           <a:xfrm rot="16200000" flipH="1">
-            <a:off x="1225614" y="3019793"/>
-            <a:ext cx="1515903" cy="1038357"/>
+            <a:off x="1734814" y="3528993"/>
+            <a:ext cx="497503" cy="1038357"/>
           </a:xfrm>
           <a:prstGeom prst="bentConnector3">
             <a:avLst>
@@ -4818,9 +4625,7 @@
           <a:prstGeom prst="rect">
             <a:avLst/>
           </a:prstGeom>
-          <a:solidFill>
-            <a:srgbClr val="FFFF00"/>
-          </a:solidFill>
+          <a:noFill/>
         </p:spPr>
         <p:txBody>
           <a:bodyPr wrap="none" lIns="0" tIns="0" rIns="0" bIns="0" rtlCol="0">
@@ -4858,6 +4663,12 @@
           <a:prstGeom prst="flowChartInternalStorage">
             <a:avLst/>
           </a:prstGeom>
+          <a:solidFill>
+            <a:schemeClr val="accent6">
+              <a:lumMod val="20000"/>
+              <a:lumOff val="80000"/>
+            </a:schemeClr>
+          </a:solidFill>
         </p:spPr>
         <p:style>
           <a:lnRef idx="2">
@@ -4879,25 +4690,10 @@
           <a:p>
             <a:pPr algn="ctr"/>
             <a:r>
-              <a:rPr lang="en-AU" sz="600" dirty="0" err="1"/>
+              <a:rPr lang="en-AU" sz="600" dirty="0" err="1" smtClean="0"/>
               <a:t>df_all_nests</a:t>
             </a:r>
             <a:endParaRPr lang="en-AU" sz="600" dirty="0"/>
-          </a:p>
-          <a:p>
-            <a:pPr algn="ctr"/>
-            <a:r>
-              <a:rPr lang="en-AU" sz="600" dirty="0"/>
-              <a:t>(unique </a:t>
-            </a:r>
-            <a:r>
-              <a:rPr lang="en-AU" sz="600" dirty="0" err="1"/>
-              <a:t>nest_ids</a:t>
-            </a:r>
-            <a:r>
-              <a:rPr lang="en-AU" sz="600" dirty="0"/>
-              <a:t>)</a:t>
-            </a:r>
           </a:p>
         </p:txBody>
       </p:sp>
@@ -4909,12 +4705,18 @@
         </p:nvSpPr>
         <p:spPr>
           <a:xfrm>
-            <a:off x="5179867" y="4962563"/>
+            <a:off x="5325608" y="4962563"/>
             <a:ext cx="723900" cy="480060"/>
           </a:xfrm>
           <a:prstGeom prst="flowChartInternalStorage">
             <a:avLst/>
           </a:prstGeom>
+          <a:solidFill>
+            <a:schemeClr val="accent6">
+              <a:lumMod val="20000"/>
+              <a:lumOff val="80000"/>
+            </a:schemeClr>
+          </a:solidFill>
         </p:spPr>
         <p:style>
           <a:lnRef idx="2">
@@ -4936,25 +4738,10 @@
           <a:p>
             <a:pPr algn="ctr"/>
             <a:r>
-              <a:rPr lang="en-AU" sz="600" dirty="0" err="1"/>
+              <a:rPr lang="en-AU" sz="600" dirty="0" err="1" smtClean="0"/>
               <a:t>gb_lay_date</a:t>
             </a:r>
             <a:endParaRPr lang="en-AU" sz="600" dirty="0"/>
-          </a:p>
-          <a:p>
-            <a:pPr algn="ctr"/>
-            <a:r>
-              <a:rPr lang="en-AU" sz="600" dirty="0"/>
-              <a:t>(</a:t>
-            </a:r>
-            <a:r>
-              <a:rPr lang="en-AU" sz="600" dirty="0" err="1"/>
-              <a:t>eqq</a:t>
-            </a:r>
-            <a:r>
-              <a:rPr lang="en-AU" sz="600" dirty="0"/>
-              <a:t> lay and courting date)</a:t>
-            </a:r>
           </a:p>
         </p:txBody>
       </p:sp>
@@ -5006,7 +4793,7 @@
         <p:spPr>
           <a:xfrm>
             <a:off x="4862450" y="1396819"/>
-            <a:ext cx="679367" cy="3565744"/>
+            <a:ext cx="825108" cy="3565744"/>
           </a:xfrm>
           <a:prstGeom prst="bentConnector2">
             <a:avLst/>
@@ -5038,12 +4825,18 @@
         </p:nvSpPr>
         <p:spPr>
           <a:xfrm>
-            <a:off x="6049508" y="4962563"/>
+            <a:off x="6195249" y="4962563"/>
             <a:ext cx="723900" cy="480060"/>
           </a:xfrm>
           <a:prstGeom prst="flowChartInternalStorage">
             <a:avLst/>
           </a:prstGeom>
+          <a:solidFill>
+            <a:schemeClr val="accent6">
+              <a:lumMod val="20000"/>
+              <a:lumOff val="80000"/>
+            </a:schemeClr>
+          </a:solidFill>
         </p:spPr>
         <p:style>
           <a:lnRef idx="2">
@@ -5084,7 +4877,7 @@
         <p:spPr>
           <a:xfrm>
             <a:off x="4862450" y="1396819"/>
-            <a:ext cx="1549008" cy="3565744"/>
+            <a:ext cx="1694749" cy="3565744"/>
           </a:xfrm>
           <a:prstGeom prst="bentConnector2">
             <a:avLst/>
@@ -5116,12 +4909,18 @@
         </p:nvSpPr>
         <p:spPr>
           <a:xfrm>
-            <a:off x="6836386" y="4962563"/>
+            <a:off x="6982127" y="4962563"/>
             <a:ext cx="723900" cy="480060"/>
           </a:xfrm>
           <a:prstGeom prst="flowChartInternalStorage">
             <a:avLst/>
           </a:prstGeom>
+          <a:solidFill>
+            <a:schemeClr val="accent6">
+              <a:lumMod val="20000"/>
+              <a:lumOff val="80000"/>
+            </a:schemeClr>
+          </a:solidFill>
         </p:spPr>
         <p:style>
           <a:lnRef idx="2">
@@ -5143,17 +4942,10 @@
           <a:p>
             <a:pPr algn="ctr"/>
             <a:r>
-              <a:rPr lang="en-AU" sz="600" dirty="0" err="1"/>
+              <a:rPr lang="en-AU" sz="600" dirty="0" err="1" smtClean="0"/>
               <a:t>gb_fledge_date</a:t>
             </a:r>
             <a:endParaRPr lang="en-AU" sz="600" dirty="0"/>
-          </a:p>
-          <a:p>
-            <a:pPr algn="ctr"/>
-            <a:r>
-              <a:rPr lang="en-AU" sz="600" dirty="0"/>
-              <a:t>(date dead or fledged)</a:t>
-            </a:r>
           </a:p>
         </p:txBody>
       </p:sp>
@@ -5169,7 +4961,7 @@
         <p:spPr>
           <a:xfrm>
             <a:off x="4862450" y="1396819"/>
-            <a:ext cx="2335886" cy="3565744"/>
+            <a:ext cx="2481627" cy="3565744"/>
           </a:xfrm>
           <a:prstGeom prst="bentConnector2">
             <a:avLst/>
@@ -5201,12 +4993,18 @@
         </p:nvSpPr>
         <p:spPr>
           <a:xfrm>
-            <a:off x="5687558" y="6083627"/>
+            <a:off x="5687558" y="6415025"/>
             <a:ext cx="786878" cy="480060"/>
           </a:xfrm>
           <a:prstGeom prst="flowChartInternalStorage">
             <a:avLst/>
           </a:prstGeom>
+          <a:solidFill>
+            <a:schemeClr val="accent6">
+              <a:lumMod val="20000"/>
+              <a:lumOff val="80000"/>
+            </a:schemeClr>
+          </a:solidFill>
         </p:spPr>
         <p:style>
           <a:lnRef idx="2">
@@ -5253,12 +5051,12 @@
         </p:nvCxnSpPr>
         <p:spPr>
           <a:xfrm rot="16200000" flipH="1">
-            <a:off x="5490905" y="5493535"/>
-            <a:ext cx="641004" cy="539180"/>
+            <a:off x="5398076" y="5732104"/>
+            <a:ext cx="972402" cy="393439"/>
           </a:xfrm>
           <a:prstGeom prst="bentConnector3">
             <a:avLst>
-              <a:gd name="adj1" fmla="val 40490"/>
+              <a:gd name="adj1" fmla="val 29103"/>
             </a:avLst>
           </a:prstGeom>
           <a:ln>
@@ -5291,12 +5089,12 @@
         </p:nvCxnSpPr>
         <p:spPr>
           <a:xfrm rot="5400000">
-            <a:off x="5925726" y="5597895"/>
-            <a:ext cx="641004" cy="330461"/>
+            <a:off x="5832897" y="5690723"/>
+            <a:ext cx="972402" cy="476202"/>
           </a:xfrm>
           <a:prstGeom prst="bentConnector3">
             <a:avLst>
-              <a:gd name="adj1" fmla="val 58321"/>
+              <a:gd name="adj1" fmla="val 50000"/>
             </a:avLst>
           </a:prstGeom>
           <a:ln>
@@ -5329,12 +5127,12 @@
         </p:nvCxnSpPr>
         <p:spPr>
           <a:xfrm rot="5400000">
-            <a:off x="6319165" y="5204456"/>
-            <a:ext cx="641004" cy="1117339"/>
+            <a:off x="6226336" y="5297284"/>
+            <a:ext cx="972402" cy="1263080"/>
           </a:xfrm>
           <a:prstGeom prst="bentConnector3">
             <a:avLst>
-              <a:gd name="adj1" fmla="val 77341"/>
+              <a:gd name="adj1" fmla="val 64366"/>
             </a:avLst>
           </a:prstGeom>
           <a:ln>
@@ -5364,7 +5162,7 @@
         </p:nvSpPr>
         <p:spPr>
           <a:xfrm>
-            <a:off x="4570088" y="5580508"/>
+            <a:off x="4288080" y="5589276"/>
             <a:ext cx="639598" cy="92333"/>
           </a:xfrm>
           <a:prstGeom prst="rect">
@@ -5401,7 +5199,7 @@
         </p:nvCxnSpPr>
         <p:spPr>
           <a:xfrm>
-            <a:off x="4727660" y="5550028"/>
+            <a:off x="4445652" y="5558796"/>
             <a:ext cx="224790" cy="0"/>
           </a:xfrm>
           <a:prstGeom prst="straightConnector1">
@@ -5437,12 +5235,12 @@
         </p:nvCxnSpPr>
         <p:spPr>
           <a:xfrm rot="16200000" flipH="1">
-            <a:off x="3035789" y="3038419"/>
-            <a:ext cx="498446" cy="5591970"/>
+            <a:off x="2870090" y="3204118"/>
+            <a:ext cx="829844" cy="5591970"/>
           </a:xfrm>
           <a:prstGeom prst="bentConnector3">
             <a:avLst>
-              <a:gd name="adj1" fmla="val 22482"/>
+              <a:gd name="adj1" fmla="val 17096"/>
             </a:avLst>
           </a:prstGeom>
           <a:ln>
@@ -5472,8 +5270,8 @@
         </p:nvSpPr>
         <p:spPr>
           <a:xfrm>
-            <a:off x="5907832" y="5580508"/>
-            <a:ext cx="1038747" cy="92333"/>
+            <a:off x="6233110" y="5580508"/>
+            <a:ext cx="679673" cy="184666"/>
           </a:xfrm>
           <a:prstGeom prst="rect">
             <a:avLst/>
@@ -5499,7 +5297,22 @@
             </a:r>
             <a:r>
               <a:rPr lang="en-AU" sz="600" dirty="0"/>
-              <a:t>, year, clutch</a:t>
+              <a:t>, </a:t>
+            </a:r>
+            <a:r>
+              <a:rPr lang="en-AU" sz="600" dirty="0" smtClean="0"/>
+              <a:t/>
+            </a:r>
+            <a:br>
+              <a:rPr lang="en-AU" sz="600" dirty="0" smtClean="0"/>
+            </a:br>
+            <a:r>
+              <a:rPr lang="en-AU" sz="600" dirty="0" err="1" smtClean="0"/>
+              <a:t>breeding_year</a:t>
+            </a:r>
+            <a:r>
+              <a:rPr lang="en-AU" sz="600" dirty="0"/>
+              <a:t>, clutch</a:t>
             </a:r>
           </a:p>
         </p:txBody>
@@ -5512,7 +5325,7 @@
         </p:nvCxnSpPr>
         <p:spPr>
           <a:xfrm flipH="1">
-            <a:off x="6264975" y="5550028"/>
+            <a:off x="6410716" y="5550028"/>
             <a:ext cx="224790" cy="0"/>
           </a:xfrm>
           <a:prstGeom prst="straightConnector1">
@@ -5545,8 +5358,8 @@
         </p:nvSpPr>
         <p:spPr>
           <a:xfrm>
-            <a:off x="6710452" y="5729782"/>
-            <a:ext cx="1038747" cy="92333"/>
+            <a:off x="7035730" y="5729782"/>
+            <a:ext cx="679673" cy="184666"/>
           </a:xfrm>
           <a:prstGeom prst="rect">
             <a:avLst/>
@@ -5572,7 +5385,22 @@
             </a:r>
             <a:r>
               <a:rPr lang="en-AU" sz="600" dirty="0"/>
-              <a:t>, year, clutch</a:t>
+              <a:t>, </a:t>
+            </a:r>
+            <a:r>
+              <a:rPr lang="en-AU" sz="600" dirty="0" smtClean="0"/>
+              <a:t/>
+            </a:r>
+            <a:br>
+              <a:rPr lang="en-AU" sz="600" dirty="0" smtClean="0"/>
+            </a:br>
+            <a:r>
+              <a:rPr lang="en-AU" sz="600" dirty="0" err="1" smtClean="0"/>
+              <a:t>breeding_year</a:t>
+            </a:r>
+            <a:r>
+              <a:rPr lang="en-AU" sz="600" dirty="0"/>
+              <a:t>, clutch</a:t>
             </a:r>
           </a:p>
         </p:txBody>
@@ -5585,7 +5413,7 @@
         </p:nvCxnSpPr>
         <p:spPr>
           <a:xfrm flipH="1">
-            <a:off x="7067595" y="5699302"/>
+            <a:off x="7213336" y="5699302"/>
             <a:ext cx="224790" cy="0"/>
           </a:xfrm>
           <a:prstGeom prst="straightConnector1">
@@ -5624,6 +5452,12 @@
           <a:prstGeom prst="flowChartInternalStorage">
             <a:avLst/>
           </a:prstGeom>
+          <a:solidFill>
+            <a:schemeClr val="accent6">
+              <a:lumMod val="20000"/>
+              <a:lumOff val="80000"/>
+            </a:schemeClr>
+          </a:solidFill>
         </p:spPr>
         <p:style>
           <a:lnRef idx="2">
@@ -5653,9 +5487,10 @@
           <a:p>
             <a:pPr algn="ctr"/>
             <a:r>
-              <a:rPr lang="en-AU" sz="600" dirty="0"/>
-              <a:t>(clutch milestone dates per nest-year)</a:t>
-            </a:r>
+              <a:rPr lang="en-AU" sz="600" dirty="0" smtClean="0"/>
+              <a:t>(lay dates for each clutch)</a:t>
+            </a:r>
+            <a:endParaRPr lang="en-AU" sz="600" dirty="0"/>
           </a:p>
         </p:txBody>
       </p:sp>
@@ -5671,7 +5506,7 @@
         <p:spPr>
           <a:xfrm flipH="1">
             <a:off x="4411027" y="5442623"/>
-            <a:ext cx="1130790" cy="1315121"/>
+            <a:ext cx="1276531" cy="1315121"/>
           </a:xfrm>
           <a:prstGeom prst="straightConnector1">
             <a:avLst/>
@@ -5785,6 +5620,12 @@
           <a:prstGeom prst="flowChartInternalStorage">
             <a:avLst/>
           </a:prstGeom>
+          <a:solidFill>
+            <a:schemeClr val="accent6">
+              <a:lumMod val="20000"/>
+              <a:lumOff val="80000"/>
+            </a:schemeClr>
+          </a:solidFill>
         </p:spPr>
         <p:style>
           <a:lnRef idx="2">
@@ -5834,6 +5675,12 @@
           <a:prstGeom prst="flowChartInternalStorage">
             <a:avLst/>
           </a:prstGeom>
+          <a:solidFill>
+            <a:schemeClr val="accent6">
+              <a:lumMod val="20000"/>
+              <a:lumOff val="80000"/>
+            </a:schemeClr>
+          </a:solidFill>
         </p:spPr>
         <p:style>
           <a:lnRef idx="2">
@@ -5863,9 +5710,18 @@
           <a:p>
             <a:pPr algn="ctr"/>
             <a:r>
-              <a:rPr lang="en-AU" sz="600" b="1" dirty="0"/>
-              <a:t>(sensor data with clutch # and phases)</a:t>
-            </a:r>
+              <a:rPr lang="en-AU" sz="600" dirty="0"/>
+              <a:t>(sensor data with clutch # and </a:t>
+            </a:r>
+            <a:r>
+              <a:rPr lang="en-AU" sz="600" dirty="0" err="1" smtClean="0"/>
+              <a:t>breeding_phase</a:t>
+            </a:r>
+            <a:r>
+              <a:rPr lang="en-AU" sz="600" dirty="0" smtClean="0"/>
+              <a:t>)</a:t>
+            </a:r>
+            <a:endParaRPr lang="en-AU" sz="600" dirty="0"/>
           </a:p>
         </p:txBody>
       </p:sp>
@@ -5880,12 +5736,12 @@
         </p:nvCxnSpPr>
         <p:spPr>
           <a:xfrm rot="16200000" flipH="1">
-            <a:off x="5225930" y="7418753"/>
-            <a:ext cx="2170237" cy="460103"/>
+            <a:off x="5391629" y="7584452"/>
+            <a:ext cx="1838839" cy="460103"/>
           </a:xfrm>
           <a:prstGeom prst="bentConnector3">
             <a:avLst>
-              <a:gd name="adj1" fmla="val 90027"/>
+              <a:gd name="adj1" fmla="val 50000"/>
             </a:avLst>
           </a:prstGeom>
           <a:ln>
@@ -6177,7 +6033,12 @@
           <a:prstGeom prst="flowChartDocument">
             <a:avLst/>
           </a:prstGeom>
-          <a:noFill/>
+          <a:solidFill>
+            <a:schemeClr val="accent6">
+              <a:lumMod val="20000"/>
+              <a:lumOff val="80000"/>
+            </a:schemeClr>
+          </a:solidFill>
         </p:spPr>
         <p:style>
           <a:lnRef idx="2">
@@ -6213,7 +6074,7 @@
         </p:nvCxnSpPr>
         <p:spPr>
           <a:xfrm flipH="1">
-            <a:off x="1352550" y="1784794"/>
+            <a:off x="1352550" y="2697641"/>
             <a:ext cx="224790" cy="0"/>
           </a:xfrm>
           <a:prstGeom prst="straightConnector1">
@@ -6252,7 +6113,12 @@
           <a:prstGeom prst="flowChartInternalStorage">
             <a:avLst/>
           </a:prstGeom>
-          <a:noFill/>
+          <a:solidFill>
+            <a:schemeClr val="accent6">
+              <a:lumMod val="20000"/>
+              <a:lumOff val="80000"/>
+            </a:schemeClr>
+          </a:solidFill>
         </p:spPr>
         <p:style>
           <a:lnRef idx="2">
@@ -6328,15 +6194,20 @@
         </p:nvCxnSpPr>
         <p:spPr>
           <a:xfrm rot="5400000">
-            <a:off x="1909953" y="1191283"/>
-            <a:ext cx="664112" cy="1555244"/>
+            <a:off x="1400753" y="1700483"/>
+            <a:ext cx="1682512" cy="1555244"/>
           </a:xfrm>
           <a:prstGeom prst="bentConnector3">
             <a:avLst>
-              <a:gd name="adj1" fmla="val 70079"/>
+              <a:gd name="adj1" fmla="val 81136"/>
             </a:avLst>
           </a:prstGeom>
           <a:ln>
+            <a:solidFill>
+              <a:schemeClr val="bg1">
+                <a:lumMod val="65000"/>
+              </a:schemeClr>
+            </a:solidFill>
             <a:tailEnd type="triangle"/>
           </a:ln>
         </p:spPr>
@@ -6363,15 +6234,13 @@
         </p:nvSpPr>
         <p:spPr>
           <a:xfrm>
-            <a:off x="1907650" y="1994126"/>
-            <a:ext cx="904094" cy="92333"/>
+            <a:off x="1907650" y="3113039"/>
+            <a:ext cx="904094" cy="184666"/>
           </a:xfrm>
           <a:prstGeom prst="rect">
             <a:avLst/>
           </a:prstGeom>
-          <a:solidFill>
-            <a:srgbClr val="FFFF00"/>
-          </a:solidFill>
+          <a:noFill/>
         </p:spPr>
         <p:txBody>
           <a:bodyPr wrap="square" lIns="0" tIns="0" rIns="0" bIns="0" rtlCol="0">
@@ -6385,8 +6254,16 @@
               <a:t>Left join on </a:t>
             </a:r>
             <a:r>
-              <a:rPr lang="en-AU" sz="600" dirty="0" err="1"/>
+              <a:rPr lang="en-AU" sz="600" dirty="0" err="1" smtClean="0"/>
               <a:t>nest_id</a:t>
+            </a:r>
+            <a:r>
+              <a:rPr lang="en-AU" sz="600" dirty="0" smtClean="0"/>
+              <a:t>, </a:t>
+            </a:r>
+            <a:r>
+              <a:rPr lang="en-AU" sz="600" dirty="0" err="1" smtClean="0"/>
+              <a:t>breeding_year</a:t>
             </a:r>
             <a:endParaRPr lang="en-AU" sz="600" dirty="0"/>
           </a:p>
@@ -6400,7 +6277,497 @@
         </p:nvCxnSpPr>
         <p:spPr>
           <a:xfrm flipH="1">
-            <a:off x="2245400" y="1929912"/>
+            <a:off x="2245400" y="3048825"/>
+            <a:ext cx="224790" cy="0"/>
+          </a:xfrm>
+          <a:prstGeom prst="straightConnector1">
+            <a:avLst/>
+          </a:prstGeom>
+          <a:ln>
+            <a:tailEnd type="triangle"/>
+          </a:ln>
+        </p:spPr>
+        <p:style>
+          <a:lnRef idx="1">
+            <a:schemeClr val="accent3"/>
+          </a:lnRef>
+          <a:fillRef idx="0">
+            <a:schemeClr val="accent3"/>
+          </a:fillRef>
+          <a:effectRef idx="0">
+            <a:schemeClr val="accent3"/>
+          </a:effectRef>
+          <a:fontRef idx="minor">
+            <a:schemeClr val="tx1"/>
+          </a:fontRef>
+        </p:style>
+      </p:cxnSp>
+      <p:sp>
+        <p:nvSpPr>
+          <p:cNvPr id="96" name="Flowchart: Internal Storage 95"/>
+          <p:cNvSpPr/>
+          <p:nvPr/>
+        </p:nvSpPr>
+        <p:spPr>
+          <a:xfrm>
+            <a:off x="1577340" y="1950507"/>
+            <a:ext cx="723900" cy="480060"/>
+          </a:xfrm>
+          <a:prstGeom prst="flowChartInternalStorage">
+            <a:avLst/>
+          </a:prstGeom>
+          <a:solidFill>
+            <a:schemeClr val="accent6">
+              <a:lumMod val="20000"/>
+              <a:lumOff val="80000"/>
+            </a:schemeClr>
+          </a:solidFill>
+        </p:spPr>
+        <p:style>
+          <a:lnRef idx="2">
+            <a:schemeClr val="accent3"/>
+          </a:lnRef>
+          <a:fillRef idx="1">
+            <a:schemeClr val="lt1"/>
+          </a:fillRef>
+          <a:effectRef idx="0">
+            <a:schemeClr val="accent3"/>
+          </a:effectRef>
+          <a:fontRef idx="minor">
+            <a:schemeClr val="dk1"/>
+          </a:fontRef>
+        </p:style>
+        <p:txBody>
+          <a:bodyPr rtlCol="0" anchor="ctr"/>
+          <a:lstStyle/>
+          <a:p>
+            <a:pPr algn="ctr"/>
+            <a:r>
+              <a:rPr lang="en-AU" sz="600" dirty="0" err="1" smtClean="0"/>
+              <a:t>df_nest_seasonal_annualised</a:t>
+            </a:r>
+            <a:endParaRPr lang="en-AU" sz="600" dirty="0"/>
+          </a:p>
+        </p:txBody>
+      </p:sp>
+      <p:cxnSp>
+        <p:nvCxnSpPr>
+          <p:cNvPr id="74" name="Straight Arrow Connector 73"/>
+          <p:cNvCxnSpPr>
+            <a:stCxn id="7" idx="2"/>
+            <a:endCxn id="96" idx="0"/>
+          </p:cNvCxnSpPr>
+          <p:nvPr/>
+        </p:nvCxnSpPr>
+        <p:spPr>
+          <a:xfrm>
+            <a:off x="1939290" y="1636849"/>
+            <a:ext cx="0" cy="313658"/>
+          </a:xfrm>
+          <a:prstGeom prst="straightConnector1">
+            <a:avLst/>
+          </a:prstGeom>
+          <a:ln>
+            <a:solidFill>
+              <a:schemeClr val="bg1">
+                <a:lumMod val="65000"/>
+              </a:schemeClr>
+            </a:solidFill>
+            <a:tailEnd type="triangle"/>
+          </a:ln>
+        </p:spPr>
+        <p:style>
+          <a:lnRef idx="1">
+            <a:schemeClr val="accent1"/>
+          </a:lnRef>
+          <a:fillRef idx="0">
+            <a:schemeClr val="accent1"/>
+          </a:fillRef>
+          <a:effectRef idx="0">
+            <a:schemeClr val="accent1"/>
+          </a:effectRef>
+          <a:fontRef idx="minor">
+            <a:schemeClr val="tx1"/>
+          </a:fontRef>
+        </p:style>
+      </p:cxnSp>
+      <p:sp>
+        <p:nvSpPr>
+          <p:cNvPr id="98" name="TextBox 97"/>
+          <p:cNvSpPr txBox="1"/>
+          <p:nvPr/>
+        </p:nvSpPr>
+        <p:spPr>
+          <a:xfrm>
+            <a:off x="1440534" y="1749723"/>
+            <a:ext cx="904094" cy="92333"/>
+          </a:xfrm>
+          <a:prstGeom prst="rect">
+            <a:avLst/>
+          </a:prstGeom>
+          <a:solidFill>
+            <a:schemeClr val="bg1"/>
+          </a:solidFill>
+        </p:spPr>
+        <p:txBody>
+          <a:bodyPr wrap="square" lIns="0" tIns="0" rIns="0" bIns="0" rtlCol="0">
+            <a:spAutoFit/>
+          </a:bodyPr>
+          <a:lstStyle/>
+          <a:p>
+            <a:pPr algn="ctr"/>
+            <a:r>
+              <a:rPr lang="en-AU" sz="600" dirty="0" smtClean="0"/>
+              <a:t>Pivot by season</a:t>
+            </a:r>
+            <a:endParaRPr lang="en-AU" sz="600" dirty="0"/>
+          </a:p>
+        </p:txBody>
+      </p:sp>
+      <p:sp>
+        <p:nvSpPr>
+          <p:cNvPr id="99" name="Rectangle 98"/>
+          <p:cNvSpPr/>
+          <p:nvPr/>
+        </p:nvSpPr>
+        <p:spPr>
+          <a:xfrm>
+            <a:off x="275866" y="4831991"/>
+            <a:ext cx="495327" cy="92333"/>
+          </a:xfrm>
+          <a:prstGeom prst="rect">
+            <a:avLst/>
+          </a:prstGeom>
+          <a:solidFill>
+            <a:schemeClr val="bg1"/>
+          </a:solidFill>
+        </p:spPr>
+        <p:txBody>
+          <a:bodyPr wrap="none" lIns="0" tIns="0" rIns="0" bIns="0" rtlCol="0">
+            <a:spAutoFit/>
+          </a:bodyPr>
+          <a:lstStyle/>
+          <a:p>
+            <a:pPr algn="ctr"/>
+            <a:r>
+              <a:rPr lang="en-AU" sz="600" dirty="0"/>
+              <a:t>unique </a:t>
+            </a:r>
+            <a:r>
+              <a:rPr lang="en-AU" sz="600" dirty="0" err="1"/>
+              <a:t>nest_ids</a:t>
+            </a:r>
+            <a:endParaRPr lang="en-AU" sz="600" dirty="0"/>
+          </a:p>
+        </p:txBody>
+      </p:sp>
+      <p:sp>
+        <p:nvSpPr>
+          <p:cNvPr id="109" name="Rectangle 108"/>
+          <p:cNvSpPr/>
+          <p:nvPr/>
+        </p:nvSpPr>
+        <p:spPr>
+          <a:xfrm>
+            <a:off x="5407387" y="4646134"/>
+            <a:ext cx="533799" cy="184666"/>
+          </a:xfrm>
+          <a:prstGeom prst="rect">
+            <a:avLst/>
+          </a:prstGeom>
+          <a:solidFill>
+            <a:schemeClr val="bg1"/>
+          </a:solidFill>
+        </p:spPr>
+        <p:txBody>
+          <a:bodyPr wrap="none" lIns="0" tIns="0" rIns="0" bIns="0" rtlCol="0">
+            <a:spAutoFit/>
+          </a:bodyPr>
+          <a:lstStyle/>
+          <a:p>
+            <a:pPr algn="ctr"/>
+            <a:r>
+              <a:rPr lang="en-AU" sz="600" dirty="0" smtClean="0"/>
+              <a:t>Lay and courting </a:t>
+            </a:r>
+          </a:p>
+          <a:p>
+            <a:pPr algn="ctr"/>
+            <a:r>
+              <a:rPr lang="en-AU" sz="600" dirty="0" smtClean="0"/>
+              <a:t>dates per clutch</a:t>
+            </a:r>
+            <a:endParaRPr lang="en-AU" sz="600" dirty="0"/>
+          </a:p>
+        </p:txBody>
+      </p:sp>
+      <p:sp>
+        <p:nvSpPr>
+          <p:cNvPr id="110" name="Rectangle 109"/>
+          <p:cNvSpPr/>
+          <p:nvPr/>
+        </p:nvSpPr>
+        <p:spPr>
+          <a:xfrm>
+            <a:off x="6362436" y="4646134"/>
+            <a:ext cx="389529" cy="184666"/>
+          </a:xfrm>
+          <a:prstGeom prst="rect">
+            <a:avLst/>
+          </a:prstGeom>
+          <a:solidFill>
+            <a:schemeClr val="bg1"/>
+          </a:solidFill>
+        </p:spPr>
+        <p:txBody>
+          <a:bodyPr wrap="none" lIns="0" tIns="0" rIns="0" bIns="0" rtlCol="0">
+            <a:spAutoFit/>
+          </a:bodyPr>
+          <a:lstStyle/>
+          <a:p>
+            <a:pPr algn="ctr"/>
+            <a:r>
+              <a:rPr lang="en-AU" sz="600" dirty="0" smtClean="0"/>
+              <a:t>Hatch dates </a:t>
+            </a:r>
+          </a:p>
+          <a:p>
+            <a:pPr algn="ctr"/>
+            <a:r>
+              <a:rPr lang="en-AU" sz="600" dirty="0" smtClean="0"/>
+              <a:t>per clutch</a:t>
+            </a:r>
+            <a:endParaRPr lang="en-AU" sz="600" dirty="0"/>
+          </a:p>
+        </p:txBody>
+      </p:sp>
+      <p:sp>
+        <p:nvSpPr>
+          <p:cNvPr id="111" name="Rectangle 110"/>
+          <p:cNvSpPr/>
+          <p:nvPr/>
+        </p:nvSpPr>
+        <p:spPr>
+          <a:xfrm>
+            <a:off x="7096174" y="4646134"/>
+            <a:ext cx="512961" cy="184666"/>
+          </a:xfrm>
+          <a:prstGeom prst="rect">
+            <a:avLst/>
+          </a:prstGeom>
+          <a:solidFill>
+            <a:schemeClr val="bg1"/>
+          </a:solidFill>
+        </p:spPr>
+        <p:txBody>
+          <a:bodyPr wrap="none" lIns="0" tIns="0" rIns="0" bIns="0" rtlCol="0">
+            <a:spAutoFit/>
+          </a:bodyPr>
+          <a:lstStyle/>
+          <a:p>
+            <a:pPr algn="ctr"/>
+            <a:r>
+              <a:rPr lang="en-AU" sz="600" dirty="0" smtClean="0"/>
+              <a:t>Fledge (or dead)</a:t>
+            </a:r>
+          </a:p>
+          <a:p>
+            <a:pPr algn="ctr"/>
+            <a:r>
+              <a:rPr lang="en-AU" sz="600" dirty="0" smtClean="0"/>
+              <a:t>dates per clutch</a:t>
+            </a:r>
+            <a:endParaRPr lang="en-AU" sz="600" dirty="0"/>
+          </a:p>
+        </p:txBody>
+      </p:sp>
+      <p:sp>
+        <p:nvSpPr>
+          <p:cNvPr id="116" name="TextBox 115"/>
+          <p:cNvSpPr txBox="1"/>
+          <p:nvPr/>
+        </p:nvSpPr>
+        <p:spPr>
+          <a:xfrm>
+            <a:off x="6461947" y="7319078"/>
+            <a:ext cx="1471557" cy="184666"/>
+          </a:xfrm>
+          <a:prstGeom prst="rect">
+            <a:avLst/>
+          </a:prstGeom>
+          <a:solidFill>
+            <a:schemeClr val="bg1"/>
+          </a:solidFill>
+        </p:spPr>
+        <p:txBody>
+          <a:bodyPr wrap="none" lIns="0" tIns="0" rIns="0" bIns="0" rtlCol="0">
+            <a:spAutoFit/>
+          </a:bodyPr>
+          <a:lstStyle/>
+          <a:p>
+            <a:pPr algn="ctr"/>
+            <a:r>
+              <a:rPr lang="en-AU" sz="600" dirty="0"/>
+              <a:t>Join (left) on </a:t>
+            </a:r>
+            <a:r>
+              <a:rPr lang="en-AU" sz="600" dirty="0" err="1" smtClean="0"/>
+              <a:t>nest_id</a:t>
+            </a:r>
+            <a:r>
+              <a:rPr lang="en-AU" sz="600" dirty="0" smtClean="0"/>
+              <a:t>, </a:t>
+            </a:r>
+            <a:r>
+              <a:rPr lang="en-AU" sz="600" dirty="0" err="1" smtClean="0"/>
+              <a:t>breeding_year</a:t>
+            </a:r>
+            <a:r>
+              <a:rPr lang="en-AU" sz="600" dirty="0" smtClean="0"/>
+              <a:t>.</a:t>
+            </a:r>
+          </a:p>
+          <a:p>
+            <a:pPr algn="ctr"/>
+            <a:r>
+              <a:rPr lang="en-AU" sz="600" dirty="0" smtClean="0"/>
+              <a:t>Assign a clutch number to each sensor reading.</a:t>
+            </a:r>
+            <a:endParaRPr lang="en-AU" sz="600" dirty="0"/>
+          </a:p>
+        </p:txBody>
+      </p:sp>
+      <p:cxnSp>
+        <p:nvCxnSpPr>
+          <p:cNvPr id="117" name="Straight Arrow Connector 116"/>
+          <p:cNvCxnSpPr/>
+          <p:nvPr/>
+        </p:nvCxnSpPr>
+        <p:spPr>
+          <a:xfrm>
+            <a:off x="7035493" y="7288598"/>
+            <a:ext cx="224790" cy="0"/>
+          </a:xfrm>
+          <a:prstGeom prst="straightConnector1">
+            <a:avLst/>
+          </a:prstGeom>
+          <a:ln>
+            <a:tailEnd type="triangle"/>
+          </a:ln>
+        </p:spPr>
+        <p:style>
+          <a:lnRef idx="1">
+            <a:schemeClr val="accent3"/>
+          </a:lnRef>
+          <a:fillRef idx="0">
+            <a:schemeClr val="accent3"/>
+          </a:fillRef>
+          <a:effectRef idx="0">
+            <a:schemeClr val="accent3"/>
+          </a:effectRef>
+          <a:fontRef idx="minor">
+            <a:schemeClr val="tx1"/>
+          </a:fontRef>
+        </p:style>
+      </p:cxnSp>
+      <p:cxnSp>
+        <p:nvCxnSpPr>
+          <p:cNvPr id="124" name="Elbow Connector 123"/>
+          <p:cNvCxnSpPr>
+            <a:endCxn id="57" idx="0"/>
+          </p:cNvCxnSpPr>
+          <p:nvPr/>
+        </p:nvCxnSpPr>
+        <p:spPr>
+          <a:xfrm rot="16200000" flipH="1">
+            <a:off x="3808003" y="4142031"/>
+            <a:ext cx="3634006" cy="911981"/>
+          </a:xfrm>
+          <a:prstGeom prst="bentConnector3">
+            <a:avLst>
+              <a:gd name="adj1" fmla="val 94384"/>
+            </a:avLst>
+          </a:prstGeom>
+          <a:ln>
+            <a:tailEnd type="triangle"/>
+          </a:ln>
+        </p:spPr>
+        <p:style>
+          <a:lnRef idx="1">
+            <a:schemeClr val="accent3"/>
+          </a:lnRef>
+          <a:fillRef idx="0">
+            <a:schemeClr val="accent3"/>
+          </a:fillRef>
+          <a:effectRef idx="0">
+            <a:schemeClr val="accent3"/>
+          </a:effectRef>
+          <a:fontRef idx="minor">
+            <a:schemeClr val="tx1"/>
+          </a:fontRef>
+        </p:style>
+      </p:cxnSp>
+      <p:sp>
+        <p:nvSpPr>
+          <p:cNvPr id="152" name="TextBox 151"/>
+          <p:cNvSpPr txBox="1"/>
+          <p:nvPr/>
+        </p:nvSpPr>
+        <p:spPr>
+          <a:xfrm>
+            <a:off x="5291641" y="6015929"/>
+            <a:ext cx="679673" cy="184666"/>
+          </a:xfrm>
+          <a:prstGeom prst="rect">
+            <a:avLst/>
+          </a:prstGeom>
+          <a:solidFill>
+            <a:schemeClr val="bg1"/>
+          </a:solidFill>
+        </p:spPr>
+        <p:txBody>
+          <a:bodyPr wrap="none" lIns="0" tIns="0" rIns="0" bIns="0" rtlCol="0">
+            <a:spAutoFit/>
+          </a:bodyPr>
+          <a:lstStyle/>
+          <a:p>
+            <a:pPr algn="ctr"/>
+            <a:r>
+              <a:rPr lang="en-AU" sz="600" dirty="0"/>
+              <a:t>Join (left) on </a:t>
+            </a:r>
+            <a:r>
+              <a:rPr lang="en-AU" sz="600" dirty="0" err="1"/>
+              <a:t>nest_id</a:t>
+            </a:r>
+            <a:r>
+              <a:rPr lang="en-AU" sz="600" dirty="0"/>
+              <a:t>, </a:t>
+            </a:r>
+            <a:r>
+              <a:rPr lang="en-AU" sz="600" dirty="0" smtClean="0"/>
+              <a:t/>
+            </a:r>
+            <a:br>
+              <a:rPr lang="en-AU" sz="600" dirty="0" smtClean="0"/>
+            </a:br>
+            <a:r>
+              <a:rPr lang="en-AU" sz="600" dirty="0" err="1" smtClean="0"/>
+              <a:t>breeding_year</a:t>
+            </a:r>
+            <a:endParaRPr lang="en-AU" sz="600" dirty="0"/>
+          </a:p>
+        </p:txBody>
+      </p:sp>
+      <p:cxnSp>
+        <p:nvCxnSpPr>
+          <p:cNvPr id="153" name="Straight Arrow Connector 152"/>
+          <p:cNvCxnSpPr/>
+          <p:nvPr/>
+        </p:nvCxnSpPr>
+        <p:spPr>
+          <a:xfrm>
+            <a:off x="5469247" y="5985449"/>
             <a:ext cx="224790" cy="0"/>
           </a:xfrm>
           <a:prstGeom prst="straightConnector1">

</xml_diff>